<commit_message>
Moved Amazon code out of main class...
...also added code to analyze the results once we get them.
</commit_message>
<xml_diff>
--- a/Presentation10-25.pptx
+++ b/Presentation10-25.pptx
@@ -11,9 +11,10 @@
     <p:sldId id="259" r:id="rId5"/>
     <p:sldId id="260" r:id="rId6"/>
     <p:sldId id="261" r:id="rId7"/>
-    <p:sldId id="262" r:id="rId8"/>
-    <p:sldId id="263" r:id="rId9"/>
-    <p:sldId id="264" r:id="rId10"/>
+    <p:sldId id="265" r:id="rId8"/>
+    <p:sldId id="262" r:id="rId9"/>
+    <p:sldId id="263" r:id="rId10"/>
+    <p:sldId id="264" r:id="rId11"/>
   </p:sldIdLst>
   <p:sldSz cx="9144000" cy="6858000" type="screen4x3"/>
   <p:notesSz cx="6858000" cy="9144000"/>
@@ -1056,6 +1057,13 @@
         </dgm:presLayoutVars>
       </dgm:prSet>
       <dgm:spPr/>
+      <dgm:t>
+        <a:bodyPr/>
+        <a:lstStyle/>
+        <a:p>
+          <a:endParaRPr lang="en-US"/>
+        </a:p>
+      </dgm:t>
     </dgm:pt>
     <dgm:pt modelId="{49A83779-8D82-4E78-B58E-8D6D482F73E3}" type="pres">
       <dgm:prSet presAssocID="{691D3C67-48E3-4B6B-A3F6-D0F6FFC4D560}" presName="node" presStyleLbl="node1" presStyleIdx="0" presStyleCnt="3" custRadScaleRad="151415" custRadScaleInc="-42847">
@@ -1064,14 +1072,35 @@
         </dgm:presLayoutVars>
       </dgm:prSet>
       <dgm:spPr/>
+      <dgm:t>
+        <a:bodyPr/>
+        <a:lstStyle/>
+        <a:p>
+          <a:endParaRPr lang="en-US"/>
+        </a:p>
+      </dgm:t>
     </dgm:pt>
     <dgm:pt modelId="{EE306B2A-BA88-4EA0-A473-1F6B53406573}" type="pres">
       <dgm:prSet presAssocID="{E1F19C87-4291-45BC-9222-105776406DC9}" presName="sibTrans" presStyleLbl="sibTrans2D1" presStyleIdx="0" presStyleCnt="3" custLinFactY="-125496" custLinFactNeighborX="82427" custLinFactNeighborY="-200000"/>
       <dgm:spPr/>
+      <dgm:t>
+        <a:bodyPr/>
+        <a:lstStyle/>
+        <a:p>
+          <a:endParaRPr lang="en-US"/>
+        </a:p>
+      </dgm:t>
     </dgm:pt>
     <dgm:pt modelId="{B65064DD-13E6-4C28-8B41-781F5ED7AC1E}" type="pres">
       <dgm:prSet presAssocID="{E1F19C87-4291-45BC-9222-105776406DC9}" presName="connectorText" presStyleLbl="sibTrans2D1" presStyleIdx="0" presStyleCnt="3"/>
       <dgm:spPr/>
+      <dgm:t>
+        <a:bodyPr/>
+        <a:lstStyle/>
+        <a:p>
+          <a:endParaRPr lang="en-US"/>
+        </a:p>
+      </dgm:t>
     </dgm:pt>
     <dgm:pt modelId="{A1352514-2667-44E7-8CEF-00702B0E9349}" type="pres">
       <dgm:prSet presAssocID="{A2F736C7-F594-44B9-BD4A-6AEB7A873C24}" presName="node" presStyleLbl="node1" presStyleIdx="1" presStyleCnt="3" custRadScaleRad="120796" custRadScaleInc="29476">
@@ -1080,14 +1109,35 @@
         </dgm:presLayoutVars>
       </dgm:prSet>
       <dgm:spPr/>
+      <dgm:t>
+        <a:bodyPr/>
+        <a:lstStyle/>
+        <a:p>
+          <a:endParaRPr lang="en-US"/>
+        </a:p>
+      </dgm:t>
     </dgm:pt>
     <dgm:pt modelId="{CD60B3C0-6517-4F22-87CF-A07DF7ACBFE8}" type="pres">
       <dgm:prSet presAssocID="{0A72A342-E9C2-40CB-BBDD-D2FD113C774C}" presName="sibTrans" presStyleLbl="sibTrans2D1" presStyleIdx="1" presStyleCnt="3"/>
       <dgm:spPr/>
+      <dgm:t>
+        <a:bodyPr/>
+        <a:lstStyle/>
+        <a:p>
+          <a:endParaRPr lang="en-US"/>
+        </a:p>
+      </dgm:t>
     </dgm:pt>
     <dgm:pt modelId="{BBB42571-DB72-403C-987B-E71BF0EC7633}" type="pres">
       <dgm:prSet presAssocID="{0A72A342-E9C2-40CB-BBDD-D2FD113C774C}" presName="connectorText" presStyleLbl="sibTrans2D1" presStyleIdx="1" presStyleCnt="3"/>
       <dgm:spPr/>
+      <dgm:t>
+        <a:bodyPr/>
+        <a:lstStyle/>
+        <a:p>
+          <a:endParaRPr lang="en-US"/>
+        </a:p>
+      </dgm:t>
     </dgm:pt>
     <dgm:pt modelId="{04805D75-358A-4994-856E-B5EC42404083}" type="pres">
       <dgm:prSet presAssocID="{9D42B003-CCE2-431D-84D8-4A39A5B8828D}" presName="node" presStyleLbl="node1" presStyleIdx="2" presStyleCnt="3" custRadScaleRad="61213" custRadScaleInc="66345">
@@ -1096,14 +1146,35 @@
         </dgm:presLayoutVars>
       </dgm:prSet>
       <dgm:spPr/>
+      <dgm:t>
+        <a:bodyPr/>
+        <a:lstStyle/>
+        <a:p>
+          <a:endParaRPr lang="en-US"/>
+        </a:p>
+      </dgm:t>
     </dgm:pt>
     <dgm:pt modelId="{52D01C1F-C1BD-4BAA-AA50-919D0636FA83}" type="pres">
       <dgm:prSet presAssocID="{0FEA359F-4D33-44D4-9A11-4730B530A832}" presName="sibTrans" presStyleLbl="sibTrans2D1" presStyleIdx="2" presStyleCnt="3"/>
       <dgm:spPr/>
+      <dgm:t>
+        <a:bodyPr/>
+        <a:lstStyle/>
+        <a:p>
+          <a:endParaRPr lang="en-US"/>
+        </a:p>
+      </dgm:t>
     </dgm:pt>
     <dgm:pt modelId="{F8BFE52D-FD7F-40C7-A723-09949C3F1766}" type="pres">
       <dgm:prSet presAssocID="{0FEA359F-4D33-44D4-9A11-4730B530A832}" presName="connectorText" presStyleLbl="sibTrans2D1" presStyleIdx="2" presStyleCnt="3"/>
       <dgm:spPr/>
+      <dgm:t>
+        <a:bodyPr/>
+        <a:lstStyle/>
+        <a:p>
+          <a:endParaRPr lang="en-US"/>
+        </a:p>
+      </dgm:t>
     </dgm:pt>
   </dgm:ptLst>
   <dgm:cxnLst>
@@ -3393,7 +3464,8 @@
           <a:p>
             <a:fld id="{CDE3FE8B-B987-4D2D-BA55-F7545B4C8397}" type="datetimeFigureOut">
               <a:rPr lang="en-US" smtClean="0"/>
-              <a:t>10/21/2012</a:t>
+              <a:pPr/>
+              <a:t>10/23/2012</a:t>
             </a:fld>
             <a:endParaRPr lang="en-US"/>
           </a:p>
@@ -3445,6 +3517,7 @@
           <a:p>
             <a:fld id="{F9599BDA-7D14-4872-B998-6F11C4EFD29D}" type="slidenum">
               <a:rPr lang="en-US" smtClean="0"/>
+              <a:pPr/>
               <a:t>‹#›</a:t>
             </a:fld>
             <a:endParaRPr lang="en-US"/>
@@ -3752,7 +3825,8 @@
           <a:p>
             <a:fld id="{CDE3FE8B-B987-4D2D-BA55-F7545B4C8397}" type="datetimeFigureOut">
               <a:rPr lang="en-US" smtClean="0"/>
-              <a:t>10/21/2012</a:t>
+              <a:pPr/>
+              <a:t>10/23/2012</a:t>
             </a:fld>
             <a:endParaRPr lang="en-US"/>
           </a:p>
@@ -3794,6 +3868,7 @@
           <a:p>
             <a:fld id="{F9599BDA-7D14-4872-B998-6F11C4EFD29D}" type="slidenum">
               <a:rPr lang="en-US" smtClean="0"/>
+              <a:pPr/>
               <a:t>‹#›</a:t>
             </a:fld>
             <a:endParaRPr lang="en-US"/>
@@ -3927,7 +4002,8 @@
           <a:p>
             <a:fld id="{CDE3FE8B-B987-4D2D-BA55-F7545B4C8397}" type="datetimeFigureOut">
               <a:rPr lang="en-US" smtClean="0"/>
-              <a:t>10/21/2012</a:t>
+              <a:pPr/>
+              <a:t>10/23/2012</a:t>
             </a:fld>
             <a:endParaRPr lang="en-US"/>
           </a:p>
@@ -3969,6 +4045,7 @@
           <a:p>
             <a:fld id="{F9599BDA-7D14-4872-B998-6F11C4EFD29D}" type="slidenum">
               <a:rPr lang="en-US" smtClean="0"/>
+              <a:pPr/>
               <a:t>‹#›</a:t>
             </a:fld>
             <a:endParaRPr lang="en-US"/>
@@ -4162,7 +4239,8 @@
           <a:p>
             <a:fld id="{CDE3FE8B-B987-4D2D-BA55-F7545B4C8397}" type="datetimeFigureOut">
               <a:rPr lang="en-US" smtClean="0"/>
-              <a:t>10/21/2012</a:t>
+              <a:pPr/>
+              <a:t>10/23/2012</a:t>
             </a:fld>
             <a:endParaRPr lang="en-US"/>
           </a:p>
@@ -4204,6 +4282,7 @@
           <a:p>
             <a:fld id="{F9599BDA-7D14-4872-B998-6F11C4EFD29D}" type="slidenum">
               <a:rPr lang="en-US" smtClean="0"/>
+              <a:pPr/>
               <a:t>‹#›</a:t>
             </a:fld>
             <a:endParaRPr lang="en-US"/>
@@ -4431,7 +4510,8 @@
           <a:p>
             <a:fld id="{CDE3FE8B-B987-4D2D-BA55-F7545B4C8397}" type="datetimeFigureOut">
               <a:rPr lang="en-US" smtClean="0"/>
-              <a:t>10/21/2012</a:t>
+              <a:pPr/>
+              <a:t>10/23/2012</a:t>
             </a:fld>
             <a:endParaRPr lang="en-US"/>
           </a:p>
@@ -4483,6 +4563,7 @@
           <a:p>
             <a:fld id="{F9599BDA-7D14-4872-B998-6F11C4EFD29D}" type="slidenum">
               <a:rPr lang="en-US" smtClean="0"/>
+              <a:pPr/>
               <a:t>‹#›</a:t>
             </a:fld>
             <a:endParaRPr lang="en-US"/>
@@ -4651,7 +4732,8 @@
           <a:p>
             <a:fld id="{CDE3FE8B-B987-4D2D-BA55-F7545B4C8397}" type="datetimeFigureOut">
               <a:rPr lang="en-US" smtClean="0"/>
-              <a:t>10/21/2012</a:t>
+              <a:pPr/>
+              <a:t>10/23/2012</a:t>
             </a:fld>
             <a:endParaRPr lang="en-US"/>
           </a:p>
@@ -4693,6 +4775,7 @@
           <a:p>
             <a:fld id="{F9599BDA-7D14-4872-B998-6F11C4EFD29D}" type="slidenum">
               <a:rPr lang="en-US" smtClean="0"/>
+              <a:pPr/>
               <a:t>‹#›</a:t>
             </a:fld>
             <a:endParaRPr lang="en-US"/>
@@ -5003,7 +5086,8 @@
           <a:p>
             <a:fld id="{CDE3FE8B-B987-4D2D-BA55-F7545B4C8397}" type="datetimeFigureOut">
               <a:rPr lang="en-US" smtClean="0"/>
-              <a:t>10/21/2012</a:t>
+              <a:pPr/>
+              <a:t>10/23/2012</a:t>
             </a:fld>
             <a:endParaRPr lang="en-US"/>
           </a:p>
@@ -5045,6 +5129,7 @@
           <a:p>
             <a:fld id="{F9599BDA-7D14-4872-B998-6F11C4EFD29D}" type="slidenum">
               <a:rPr lang="en-US" smtClean="0"/>
+              <a:pPr/>
               <a:t>‹#›</a:t>
             </a:fld>
             <a:endParaRPr lang="en-US"/>
@@ -5235,7 +5320,8 @@
           <a:p>
             <a:fld id="{CDE3FE8B-B987-4D2D-BA55-F7545B4C8397}" type="datetimeFigureOut">
               <a:rPr lang="en-US" smtClean="0"/>
-              <a:t>10/21/2012</a:t>
+              <a:pPr/>
+              <a:t>10/23/2012</a:t>
             </a:fld>
             <a:endParaRPr lang="en-US"/>
           </a:p>
@@ -5277,6 +5363,7 @@
           <a:p>
             <a:fld id="{F9599BDA-7D14-4872-B998-6F11C4EFD29D}" type="slidenum">
               <a:rPr lang="en-US" smtClean="0"/>
+              <a:pPr/>
               <a:t>‹#›</a:t>
             </a:fld>
             <a:endParaRPr lang="en-US"/>
@@ -5375,7 +5462,8 @@
           <a:p>
             <a:fld id="{CDE3FE8B-B987-4D2D-BA55-F7545B4C8397}" type="datetimeFigureOut">
               <a:rPr lang="en-US" smtClean="0"/>
-              <a:t>10/21/2012</a:t>
+              <a:pPr/>
+              <a:t>10/23/2012</a:t>
             </a:fld>
             <a:endParaRPr lang="en-US"/>
           </a:p>
@@ -5417,6 +5505,7 @@
           <a:p>
             <a:fld id="{F9599BDA-7D14-4872-B998-6F11C4EFD29D}" type="slidenum">
               <a:rPr lang="en-US" smtClean="0"/>
+              <a:pPr/>
               <a:t>‹#›</a:t>
             </a:fld>
             <a:endParaRPr lang="en-US"/>
@@ -5652,7 +5741,8 @@
           <a:p>
             <a:fld id="{CDE3FE8B-B987-4D2D-BA55-F7545B4C8397}" type="datetimeFigureOut">
               <a:rPr lang="en-US" smtClean="0"/>
-              <a:t>10/21/2012</a:t>
+              <a:pPr/>
+              <a:t>10/23/2012</a:t>
             </a:fld>
             <a:endParaRPr lang="en-US"/>
           </a:p>
@@ -5694,6 +5784,7 @@
           <a:p>
             <a:fld id="{F9599BDA-7D14-4872-B998-6F11C4EFD29D}" type="slidenum">
               <a:rPr lang="en-US" smtClean="0"/>
+              <a:pPr/>
               <a:t>‹#›</a:t>
             </a:fld>
             <a:endParaRPr lang="en-US"/>
@@ -6059,7 +6150,8 @@
           <a:p>
             <a:fld id="{CDE3FE8B-B987-4D2D-BA55-F7545B4C8397}" type="datetimeFigureOut">
               <a:rPr lang="en-US" smtClean="0"/>
-              <a:t>10/21/2012</a:t>
+              <a:pPr/>
+              <a:t>10/23/2012</a:t>
             </a:fld>
             <a:endParaRPr lang="en-US"/>
           </a:p>
@@ -6101,6 +6193,7 @@
           <a:p>
             <a:fld id="{F9599BDA-7D14-4872-B998-6F11C4EFD29D}" type="slidenum">
               <a:rPr lang="en-US" smtClean="0"/>
+              <a:pPr/>
               <a:t>‹#›</a:t>
             </a:fld>
             <a:endParaRPr lang="en-US"/>
@@ -6397,7 +6490,8 @@
           <a:p>
             <a:fld id="{CDE3FE8B-B987-4D2D-BA55-F7545B4C8397}" type="datetimeFigureOut">
               <a:rPr lang="en-US" smtClean="0"/>
-              <a:t>10/21/2012</a:t>
+              <a:pPr/>
+              <a:t>10/23/2012</a:t>
             </a:fld>
             <a:endParaRPr lang="en-US"/>
           </a:p>
@@ -6471,6 +6565,7 @@
           <a:p>
             <a:fld id="{F9599BDA-7D14-4872-B998-6F11C4EFD29D}" type="slidenum">
               <a:rPr lang="en-US" smtClean="0"/>
+              <a:pPr/>
               <a:t>‹#›</a:t>
             </a:fld>
             <a:endParaRPr lang="en-US"/>
@@ -7006,6 +7101,90 @@
 </p:sld>
 </file>
 
+<file path=ppt/slides/slide10.xml><?xml version="1.0" encoding="utf-8"?>
+<p:sld xmlns:a="http://schemas.openxmlformats.org/drawingml/2006/main" xmlns:r="http://schemas.openxmlformats.org/officeDocument/2006/relationships" xmlns:p="http://schemas.openxmlformats.org/presentationml/2006/main">
+  <p:cSld>
+    <p:spTree>
+      <p:nvGrpSpPr>
+        <p:cNvPr id="1" name=""/>
+        <p:cNvGrpSpPr/>
+        <p:nvPr/>
+      </p:nvGrpSpPr>
+      <p:grpSpPr>
+        <a:xfrm>
+          <a:off x="0" y="0"/>
+          <a:ext cx="0" cy="0"/>
+          <a:chOff x="0" y="0"/>
+          <a:chExt cx="0" cy="0"/>
+        </a:xfrm>
+      </p:grpSpPr>
+      <p:sp>
+        <p:nvSpPr>
+          <p:cNvPr id="4" name="Title 3"/>
+          <p:cNvSpPr>
+            <a:spLocks noGrp="1"/>
+          </p:cNvSpPr>
+          <p:nvPr>
+            <p:ph type="title"/>
+          </p:nvPr>
+        </p:nvSpPr>
+        <p:spPr/>
+        <p:txBody>
+          <a:bodyPr/>
+          <a:lstStyle/>
+          <a:p>
+            <a:pPr algn="ctr"/>
+            <a:r>
+              <a:rPr lang="en-US" dirty="0" smtClean="0"/>
+              <a:t>Questions?</a:t>
+            </a:r>
+            <a:endParaRPr lang="en-US" dirty="0"/>
+          </a:p>
+        </p:txBody>
+      </p:sp>
+      <p:pic>
+        <p:nvPicPr>
+          <p:cNvPr id="1029" name="Picture 5" descr="C:\Users\Los Haches\AppData\Local\Microsoft\Windows\Temporary Internet Files\Content.IE5\HJB9DV5F\MC910216407[1].png"/>
+          <p:cNvPicPr>
+            <a:picLocks noGrp="1" noChangeAspect="1" noChangeArrowheads="1"/>
+          </p:cNvPicPr>
+          <p:nvPr>
+            <p:ph sz="quarter" idx="1"/>
+          </p:nvPr>
+        </p:nvPicPr>
+        <p:blipFill>
+          <a:blip r:embed="rId2" cstate="print"/>
+          <a:srcRect/>
+          <a:stretch>
+            <a:fillRect/>
+          </a:stretch>
+        </p:blipFill>
+        <p:spPr bwMode="auto">
+          <a:xfrm>
+            <a:off x="2390775" y="1787525"/>
+            <a:ext cx="4362450" cy="3800475"/>
+          </a:xfrm>
+          <a:prstGeom prst="rect">
+            <a:avLst/>
+          </a:prstGeom>
+          <a:noFill/>
+        </p:spPr>
+      </p:pic>
+    </p:spTree>
+  </p:cSld>
+  <p:clrMapOvr>
+    <a:masterClrMapping/>
+  </p:clrMapOvr>
+  <p:timing>
+    <p:tnLst>
+      <p:par>
+        <p:cTn id="1" dur="indefinite" restart="never" nodeType="tmRoot"/>
+      </p:par>
+    </p:tnLst>
+  </p:timing>
+</p:sld>
+</file>
+
 <file path=ppt/slides/slide2.xml><?xml version="1.0" encoding="utf-8"?>
 <p:sld xmlns:a="http://schemas.openxmlformats.org/drawingml/2006/main" xmlns:r="http://schemas.openxmlformats.org/officeDocument/2006/relationships" xmlns:p="http://schemas.openxmlformats.org/presentationml/2006/main">
   <p:cSld>
@@ -7065,11 +7244,7 @@
           <a:p>
             <a:r>
               <a:rPr lang="en-US" dirty="0" smtClean="0"/>
-              <a:t>Justin </a:t>
-            </a:r>
-            <a:r>
-              <a:rPr lang="en-US" dirty="0" smtClean="0"/>
-              <a:t>Richardson</a:t>
+              <a:t>Justin Richardson</a:t>
             </a:r>
           </a:p>
           <a:p>
@@ -7096,11 +7271,7 @@
             <a:pPr lvl="1"/>
             <a:r>
               <a:rPr lang="en-US" dirty="0" smtClean="0"/>
-              <a:t>Japanese animation </a:t>
-            </a:r>
-            <a:r>
-              <a:rPr lang="en-US" dirty="0" smtClean="0"/>
-              <a:t>collectibles</a:t>
+              <a:t>Japanese animation collectibles</a:t>
             </a:r>
           </a:p>
           <a:p>
@@ -7583,11 +7754,7 @@
             <a:pPr lvl="1"/>
             <a:r>
               <a:rPr lang="en-US" dirty="0" smtClean="0"/>
-              <a:t>Web </a:t>
-            </a:r>
-            <a:r>
-              <a:rPr lang="en-US" dirty="0" smtClean="0"/>
-              <a:t>scraper</a:t>
+              <a:t>Web scraper</a:t>
             </a:r>
           </a:p>
           <a:p>
@@ -7650,7 +7817,7 @@
       </p:grpSpPr>
       <p:sp>
         <p:nvSpPr>
-          <p:cNvPr id="2" name="Title 1"/>
+          <p:cNvPr id="6" name="Title 5"/>
           <p:cNvSpPr>
             <a:spLocks noGrp="1"/>
           </p:cNvSpPr>
@@ -7665,7 +7832,7 @@
           <a:p>
             <a:r>
               <a:rPr lang="en-US" dirty="0" smtClean="0"/>
-              <a:t>Amazon</a:t>
+              <a:t>Form</a:t>
             </a:r>
             <a:endParaRPr lang="en-US" dirty="0"/>
           </a:p>
@@ -7673,90 +7840,114 @@
       </p:sp>
       <p:sp>
         <p:nvSpPr>
-          <p:cNvPr id="3" name="Content Placeholder 2"/>
+          <p:cNvPr id="9" name="Content Placeholder 8"/>
           <p:cNvSpPr>
             <a:spLocks noGrp="1"/>
           </p:cNvSpPr>
+          <p:nvPr>
+            <p:ph sz="quarter" idx="2"/>
+          </p:nvPr>
+        </p:nvSpPr>
+        <p:spPr/>
+        <p:txBody>
+          <a:bodyPr>
+            <a:normAutofit fontScale="92500" lnSpcReduction="10000"/>
+          </a:bodyPr>
+          <a:lstStyle/>
+          <a:p>
+            <a:r>
+              <a:rPr lang="en-US" dirty="0" smtClean="0"/>
+              <a:t>Display the results</a:t>
+            </a:r>
+          </a:p>
+          <a:p>
+            <a:r>
+              <a:rPr lang="en-US" dirty="0" smtClean="0"/>
+              <a:t>Offer a number of options</a:t>
+            </a:r>
+          </a:p>
+          <a:p>
+            <a:pPr lvl="1"/>
+            <a:r>
+              <a:rPr lang="en-US" dirty="0" smtClean="0"/>
+              <a:t>Allow sorting by</a:t>
+            </a:r>
+          </a:p>
+          <a:p>
+            <a:pPr lvl="2"/>
+            <a:r>
+              <a:rPr lang="en-US" dirty="0" smtClean="0"/>
+              <a:t>Price (low to high)</a:t>
+            </a:r>
+          </a:p>
+          <a:p>
+            <a:pPr lvl="2"/>
+            <a:r>
+              <a:rPr lang="en-US" dirty="0" smtClean="0"/>
+              <a:t>Price (high to low)</a:t>
+            </a:r>
+          </a:p>
+          <a:p>
+            <a:pPr lvl="2"/>
+            <a:r>
+              <a:rPr lang="en-US" dirty="0" smtClean="0"/>
+              <a:t>Difference (low to high)</a:t>
+            </a:r>
+          </a:p>
+          <a:p>
+            <a:pPr lvl="2"/>
+            <a:r>
+              <a:rPr lang="en-US" dirty="0" smtClean="0"/>
+              <a:t>Difference (high to low)</a:t>
+            </a:r>
+          </a:p>
+          <a:p>
+            <a:pPr lvl="1"/>
+            <a:r>
+              <a:rPr lang="en-US" dirty="0" smtClean="0"/>
+              <a:t>Change the number of results on a screen</a:t>
+            </a:r>
+          </a:p>
+          <a:p>
+            <a:pPr lvl="1"/>
+            <a:r>
+              <a:rPr lang="en-US" dirty="0" smtClean="0"/>
+              <a:t>Only show items with a higher price on Amazon or a lower price on Amazon</a:t>
+            </a:r>
+          </a:p>
+          <a:p>
+            <a:pPr lvl="1"/>
+            <a:r>
+              <a:rPr lang="en-US" dirty="0" smtClean="0"/>
+              <a:t>Allow prices to be modified from the form</a:t>
+            </a:r>
+            <a:endParaRPr lang="en-US" dirty="0"/>
+          </a:p>
+        </p:txBody>
+      </p:sp>
+      <p:pic>
+        <p:nvPicPr>
+          <p:cNvPr id="13" name="Content Placeholder 12" descr="AmazonPriceFinder.jpg"/>
+          <p:cNvPicPr>
+            <a:picLocks noGrp="1" noChangeAspect="1"/>
+          </p:cNvPicPr>
           <p:nvPr>
             <p:ph sz="quarter" idx="1"/>
           </p:nvPr>
-        </p:nvSpPr>
-        <p:spPr/>
-        <p:txBody>
-          <a:bodyPr/>
-          <a:lstStyle/>
-          <a:p>
-            <a:r>
-              <a:rPr lang="en-US" dirty="0" smtClean="0"/>
-              <a:t>Amazon Web Services API</a:t>
-            </a:r>
-          </a:p>
-          <a:p>
-            <a:pPr lvl="1"/>
-            <a:r>
-              <a:rPr lang="en-US" dirty="0" smtClean="0"/>
-              <a:t>Contains code allowing a search of Amazon.com</a:t>
-            </a:r>
-          </a:p>
-          <a:p>
-            <a:pPr lvl="1"/>
-            <a:r>
-              <a:rPr lang="en-US" dirty="0" smtClean="0"/>
-              <a:t>Methods like “</a:t>
-            </a:r>
-            <a:r>
-              <a:rPr lang="en-US" dirty="0" err="1" smtClean="0"/>
-              <a:t>ItemSearch</a:t>
-            </a:r>
-            <a:r>
-              <a:rPr lang="en-US" dirty="0" smtClean="0"/>
-              <a:t>” and “</a:t>
-            </a:r>
-            <a:r>
-              <a:rPr lang="en-US" dirty="0" err="1" smtClean="0"/>
-              <a:t>ItemLookup</a:t>
-            </a:r>
-            <a:r>
-              <a:rPr lang="en-US" dirty="0" smtClean="0"/>
-              <a:t>”</a:t>
-            </a:r>
-          </a:p>
-          <a:p>
-            <a:pPr lvl="1"/>
-            <a:r>
-              <a:rPr lang="en-US" dirty="0" smtClean="0"/>
-              <a:t>Need AWS Access Key ID</a:t>
-            </a:r>
-          </a:p>
-          <a:p>
-            <a:r>
-              <a:rPr lang="en-US" dirty="0" smtClean="0"/>
-              <a:t>Web scraper</a:t>
-            </a:r>
-          </a:p>
-          <a:p>
-            <a:pPr lvl="1"/>
-            <a:r>
-              <a:rPr lang="en-US" dirty="0" smtClean="0"/>
-              <a:t>If AWS does not work</a:t>
-            </a:r>
-          </a:p>
-          <a:p>
-            <a:pPr lvl="1"/>
-            <a:r>
-              <a:rPr lang="en-US" dirty="0" smtClean="0"/>
-              <a:t>Scrape page</a:t>
-            </a:r>
-          </a:p>
-          <a:p>
-            <a:pPr lvl="1"/>
-            <a:r>
-              <a:rPr lang="en-US" dirty="0" smtClean="0"/>
-              <a:t>Parse information (regular expressions)</a:t>
-            </a:r>
-          </a:p>
-        </p:txBody>
-      </p:sp>
+        </p:nvPicPr>
+        <p:blipFill>
+          <a:blip r:embed="rId2" cstate="print"/>
+          <a:stretch>
+            <a:fillRect/>
+          </a:stretch>
+        </p:blipFill>
+        <p:spPr>
+          <a:xfrm>
+            <a:off x="457200" y="1578045"/>
+            <a:ext cx="4041775" cy="4219435"/>
+          </a:xfrm>
+        </p:spPr>
+      </p:pic>
     </p:spTree>
   </p:cSld>
   <p:clrMapOvr>
@@ -7806,7 +7997,7 @@
           <a:p>
             <a:r>
               <a:rPr lang="en-US" dirty="0" smtClean="0"/>
-              <a:t>To Do</a:t>
+              <a:t>Amazon</a:t>
             </a:r>
             <a:endParaRPr lang="en-US" dirty="0"/>
           </a:p>
@@ -7829,67 +8020,71 @@
           <a:p>
             <a:r>
               <a:rPr lang="en-US" dirty="0" smtClean="0"/>
-              <a:t>Get application to communicate with database</a:t>
+              <a:t>Amazon Web Services API</a:t>
             </a:r>
           </a:p>
           <a:p>
             <a:pPr lvl="1"/>
             <a:r>
               <a:rPr lang="en-US" dirty="0" smtClean="0"/>
-              <a:t>Read from and write to</a:t>
-            </a:r>
-          </a:p>
-          <a:p>
+              <a:t>Contains code allowing a search of Amazon.com</a:t>
+            </a:r>
+          </a:p>
+          <a:p>
+            <a:pPr lvl="1"/>
             <a:r>
               <a:rPr lang="en-US" dirty="0" smtClean="0"/>
-              <a:t>Get application to communicate with Amazon</a:t>
+              <a:t>Methods like “</a:t>
+            </a:r>
+            <a:r>
+              <a:rPr lang="en-US" dirty="0" err="1" smtClean="0"/>
+              <a:t>ItemSearch</a:t>
+            </a:r>
+            <a:r>
+              <a:rPr lang="en-US" dirty="0" smtClean="0"/>
+              <a:t>” and “</a:t>
+            </a:r>
+            <a:r>
+              <a:rPr lang="en-US" dirty="0" err="1" smtClean="0"/>
+              <a:t>ItemLookup</a:t>
+            </a:r>
+            <a:r>
+              <a:rPr lang="en-US" dirty="0" smtClean="0"/>
+              <a:t>”</a:t>
             </a:r>
           </a:p>
           <a:p>
             <a:pPr lvl="1"/>
             <a:r>
               <a:rPr lang="en-US" dirty="0" smtClean="0"/>
-              <a:t>Retrieve pricing information</a:t>
+              <a:t>Need AWS Access Key ID</a:t>
             </a:r>
           </a:p>
           <a:p>
             <a:r>
               <a:rPr lang="en-US" dirty="0" smtClean="0"/>
-              <a:t>Analyze prices</a:t>
+              <a:t>Web scraper</a:t>
             </a:r>
           </a:p>
           <a:p>
             <a:pPr lvl="1"/>
             <a:r>
               <a:rPr lang="en-US" dirty="0" smtClean="0"/>
-              <a:t>Remove outliers</a:t>
+              <a:t>If AWS does not work</a:t>
             </a:r>
           </a:p>
           <a:p>
             <a:pPr lvl="1"/>
             <a:r>
               <a:rPr lang="en-US" dirty="0" smtClean="0"/>
-              <a:t>Average</a:t>
-            </a:r>
-          </a:p>
-          <a:p>
+              <a:t>Scrape page</a:t>
+            </a:r>
+          </a:p>
+          <a:p>
+            <a:pPr lvl="1"/>
             <a:r>
               <a:rPr lang="en-US" dirty="0" smtClean="0"/>
-              <a:t>Display results on form</a:t>
-            </a:r>
-          </a:p>
-          <a:p>
-            <a:pPr lvl="1"/>
-            <a:r>
-              <a:rPr lang="en-US" dirty="0" smtClean="0"/>
-              <a:t>Average</a:t>
-            </a:r>
-          </a:p>
-          <a:p>
-            <a:pPr lvl="1"/>
-            <a:r>
-              <a:rPr lang="en-US" dirty="0" smtClean="0"/>
-              <a:t>Possibly highest and lowest prices</a:t>
+              <a:t>Parse information (regular expressions)</a:t>
             </a:r>
           </a:p>
         </p:txBody>
@@ -7928,7 +8123,7 @@
       </p:grpSpPr>
       <p:sp>
         <p:nvSpPr>
-          <p:cNvPr id="4" name="Title 3"/>
+          <p:cNvPr id="2" name="Title 1"/>
           <p:cNvSpPr>
             <a:spLocks noGrp="1"/>
           </p:cNvSpPr>
@@ -7941,43 +8136,96 @@
           <a:bodyPr/>
           <a:lstStyle/>
           <a:p>
-            <a:pPr algn="ctr"/>
             <a:r>
               <a:rPr lang="en-US" dirty="0" smtClean="0"/>
-              <a:t>Questions?</a:t>
+              <a:t>To Do</a:t>
             </a:r>
             <a:endParaRPr lang="en-US" dirty="0"/>
           </a:p>
         </p:txBody>
       </p:sp>
-      <p:pic>
-        <p:nvPicPr>
-          <p:cNvPr id="1029" name="Picture 5" descr="C:\Users\Los Haches\AppData\Local\Microsoft\Windows\Temporary Internet Files\Content.IE5\HJB9DV5F\MC910216407[1].png"/>
-          <p:cNvPicPr>
-            <a:picLocks noGrp="1" noChangeAspect="1" noChangeArrowheads="1"/>
-          </p:cNvPicPr>
+      <p:sp>
+        <p:nvSpPr>
+          <p:cNvPr id="3" name="Content Placeholder 2"/>
+          <p:cNvSpPr>
+            <a:spLocks noGrp="1"/>
+          </p:cNvSpPr>
           <p:nvPr>
             <p:ph sz="quarter" idx="1"/>
           </p:nvPr>
-        </p:nvPicPr>
-        <p:blipFill>
-          <a:blip r:embed="rId2" cstate="print"/>
-          <a:srcRect/>
-          <a:stretch>
-            <a:fillRect/>
-          </a:stretch>
-        </p:blipFill>
-        <p:spPr bwMode="auto">
-          <a:xfrm>
-            <a:off x="2390775" y="1787525"/>
-            <a:ext cx="4362450" cy="3800475"/>
-          </a:xfrm>
-          <a:prstGeom prst="rect">
-            <a:avLst/>
-          </a:prstGeom>
-          <a:noFill/>
-        </p:spPr>
-      </p:pic>
+        </p:nvSpPr>
+        <p:spPr/>
+        <p:txBody>
+          <a:bodyPr/>
+          <a:lstStyle/>
+          <a:p>
+            <a:r>
+              <a:rPr lang="en-US" dirty="0" smtClean="0"/>
+              <a:t>Get application to communicate with database</a:t>
+            </a:r>
+          </a:p>
+          <a:p>
+            <a:pPr lvl="1"/>
+            <a:r>
+              <a:rPr lang="en-US" dirty="0" smtClean="0"/>
+              <a:t>Read from and write to</a:t>
+            </a:r>
+          </a:p>
+          <a:p>
+            <a:r>
+              <a:rPr lang="en-US" dirty="0" smtClean="0"/>
+              <a:t>Get application to communicate with Amazon</a:t>
+            </a:r>
+          </a:p>
+          <a:p>
+            <a:pPr lvl="1"/>
+            <a:r>
+              <a:rPr lang="en-US" dirty="0" smtClean="0"/>
+              <a:t>Retrieve pricing information</a:t>
+            </a:r>
+          </a:p>
+          <a:p>
+            <a:r>
+              <a:rPr lang="en-US" dirty="0" smtClean="0"/>
+              <a:t>Analyze prices</a:t>
+            </a:r>
+          </a:p>
+          <a:p>
+            <a:pPr lvl="1"/>
+            <a:r>
+              <a:rPr lang="en-US" dirty="0" smtClean="0"/>
+              <a:t>Remove outliers</a:t>
+            </a:r>
+          </a:p>
+          <a:p>
+            <a:pPr lvl="1"/>
+            <a:r>
+              <a:rPr lang="en-US" dirty="0" smtClean="0"/>
+              <a:t>Average</a:t>
+            </a:r>
+          </a:p>
+          <a:p>
+            <a:r>
+              <a:rPr lang="en-US" dirty="0" smtClean="0"/>
+              <a:t>Display results on form</a:t>
+            </a:r>
+          </a:p>
+          <a:p>
+            <a:pPr lvl="1"/>
+            <a:r>
+              <a:rPr lang="en-US" dirty="0" smtClean="0"/>
+              <a:t>Average</a:t>
+            </a:r>
+          </a:p>
+          <a:p>
+            <a:pPr lvl="1"/>
+            <a:r>
+              <a:rPr lang="en-US" dirty="0" smtClean="0"/>
+              <a:t>Possibly highest and lowest prices</a:t>
+            </a:r>
+          </a:p>
+        </p:txBody>
+      </p:sp>
     </p:spTree>
   </p:cSld>
   <p:clrMapOvr>

</xml_diff>